<commit_message>
Admin for 1st lecture and Introduction for 2nd lecture are ready
</commit_message>
<xml_diff>
--- a/lectures/00a_admin/00a_admin.pptx
+++ b/lectures/00a_admin/00a_admin.pptx
@@ -221,7 +221,7 @@
           <a:p>
             <a:fld id="{CC7A41CC-C61C-2F43-A643-7ED1F9C31B07}" type="datetimeFigureOut">
               <a:rPr lang="it-IT" smtClean="0"/>
-              <a:t>22/08/23</a:t>
+              <a:t>11/09/23</a:t>
             </a:fld>
             <a:endParaRPr lang="it-IT" dirty="0"/>
           </a:p>
@@ -6038,7 +6038,17 @@
                 <a:effectLst/>
                 <a:latin typeface="Helvetica" pitchFamily="2" charset="0"/>
               </a:rPr>
-              <a:t>Students can get </a:t>
+              <a:t>Students </a:t>
+            </a:r>
+            <a:r>
+              <a:rPr lang="en-GB" b="0" i="0" u="none" strike="noStrike">
+                <a:solidFill>
+                  <a:srgbClr val="000000"/>
+                </a:solidFill>
+                <a:effectLst/>
+                <a:latin typeface="Helvetica" pitchFamily="2" charset="0"/>
+              </a:rPr>
+              <a:t>can get up to </a:t>
             </a:r>
             <a:r>
               <a:rPr lang="en-GB" b="1" i="0" u="none" strike="noStrike" dirty="0">
@@ -6340,14 +6350,23 @@
             </a:r>
           </a:p>
           <a:p>
-            <a:pPr algn="l">
-              <a:buFont typeface="Arial" panose="020B0604020202020204" pitchFamily="34" charset="0"/>
-              <a:buChar char="•"/>
-            </a:pPr>
-            <a:endParaRPr lang="en-GB" b="1" dirty="0">
+            <a:pPr lvl="1"/>
+            <a:r>
+              <a:rPr lang="en-GB" sz="2000" b="1" dirty="0">
+                <a:solidFill>
+                  <a:srgbClr val="000000"/>
+                </a:solidFill>
+                <a:latin typeface="Helvetica" pitchFamily="2" charset="0"/>
+              </a:rPr>
+              <a:t>The mark obtained with the optional continuous evaluation does not count.</a:t>
+            </a:r>
+          </a:p>
+          <a:p>
+            <a:endParaRPr lang="en-GB" b="0" i="0" u="none" strike="noStrike" dirty="0">
               <a:solidFill>
                 <a:srgbClr val="000000"/>
               </a:solidFill>
+              <a:effectLst/>
               <a:latin typeface="Helvetica" pitchFamily="2" charset="0"/>
             </a:endParaRPr>
           </a:p>
@@ -7423,6 +7442,75 @@
       </p:grpSpPr>
       <p:sp>
         <p:nvSpPr>
+          <p:cNvPr id="2" name="Footer Placeholder 1">
+            <a:extLst>
+              <a:ext uri="{FF2B5EF4-FFF2-40B4-BE49-F238E27FC236}">
+                <a16:creationId xmlns:a16="http://schemas.microsoft.com/office/drawing/2014/main" id="{E4684030-D19C-D50C-0EF2-2B039C904C99}"/>
+              </a:ext>
+            </a:extLst>
+          </p:cNvPr>
+          <p:cNvSpPr>
+            <a:spLocks noGrp="1"/>
+          </p:cNvSpPr>
+          <p:nvPr>
+            <p:ph type="ftr" sz="quarter" idx="10"/>
+          </p:nvPr>
+        </p:nvSpPr>
+        <p:spPr>
+          <a:xfrm>
+            <a:off x="3270173" y="6356350"/>
+            <a:ext cx="5651653" cy="365125"/>
+          </a:xfrm>
+        </p:spPr>
+        <p:txBody>
+          <a:bodyPr/>
+          <a:lstStyle/>
+          <a:p>
+            <a:r>
+              <a:rPr lang="it-IT"/>
+              <a:t>Emanuele Della Valle - http://emanueledellavalle.org</a:t>
+            </a:r>
+            <a:endParaRPr lang="it-IT" dirty="0"/>
+          </a:p>
+        </p:txBody>
+      </p:sp>
+      <p:sp>
+        <p:nvSpPr>
+          <p:cNvPr id="3" name="Slide Number Placeholder 2">
+            <a:extLst>
+              <a:ext uri="{FF2B5EF4-FFF2-40B4-BE49-F238E27FC236}">
+                <a16:creationId xmlns:a16="http://schemas.microsoft.com/office/drawing/2014/main" id="{BD819743-D372-A259-D37C-10FF04E04D5D}"/>
+              </a:ext>
+            </a:extLst>
+          </p:cNvPr>
+          <p:cNvSpPr>
+            <a:spLocks noGrp="1"/>
+          </p:cNvSpPr>
+          <p:nvPr>
+            <p:ph type="sldNum" sz="quarter" idx="11"/>
+          </p:nvPr>
+        </p:nvSpPr>
+        <p:spPr>
+          <a:xfrm>
+            <a:off x="9135938" y="6356350"/>
+            <a:ext cx="2217861" cy="365125"/>
+          </a:xfrm>
+        </p:spPr>
+        <p:txBody>
+          <a:bodyPr/>
+          <a:lstStyle/>
+          <a:p>
+            <a:fld id="{0365D038-E70F-B244-A1AE-4DC4A8F32122}" type="slidenum">
+              <a:rPr lang="it-IT" smtClean="0"/>
+              <a:pPr/>
+              <a:t>3</a:t>
+            </a:fld>
+            <a:endParaRPr lang="it-IT" dirty="0"/>
+          </a:p>
+        </p:txBody>
+      </p:sp>
+      <p:sp>
+        <p:nvSpPr>
           <p:cNvPr id="4" name="Title 3">
             <a:extLst>
               <a:ext uri="{FF2B5EF4-FFF2-40B4-BE49-F238E27FC236}">
@@ -7437,7 +7525,12 @@
             <p:ph type="title"/>
           </p:nvPr>
         </p:nvSpPr>
-        <p:spPr/>
+        <p:spPr>
+          <a:xfrm>
+            <a:off x="838200" y="365125"/>
+            <a:ext cx="8315325" cy="1325563"/>
+          </a:xfrm>
+        </p:spPr>
         <p:txBody>
           <a:bodyPr/>
           <a:lstStyle/>
@@ -7463,15 +7556,16 @@
         </p:nvSpPr>
         <p:spPr>
           <a:xfrm>
-            <a:off x="838200" y="4326611"/>
+            <a:off x="838200" y="3485363"/>
             <a:ext cx="2869696" cy="400110"/>
           </a:xfrm>
           <a:prstGeom prst="rect">
             <a:avLst/>
           </a:prstGeom>
-          <a:solidFill>
-            <a:srgbClr val="FFFF00"/>
-          </a:solidFill>
+          <a:noFill/>
+          <a:ln>
+            <a:noFill/>
+          </a:ln>
         </p:spPr>
         <p:txBody>
           <a:bodyPr wrap="none" rtlCol="0">
@@ -7527,18 +7621,19 @@
         </p:nvSpPr>
         <p:spPr>
           <a:xfrm>
-            <a:off x="855133" y="4687299"/>
-            <a:ext cx="3076483" cy="1077218"/>
+            <a:off x="855134" y="3846051"/>
+            <a:ext cx="3657599" cy="2554545"/>
           </a:xfrm>
           <a:prstGeom prst="rect">
             <a:avLst/>
           </a:prstGeom>
-          <a:solidFill>
-            <a:srgbClr val="FFFF00"/>
-          </a:solidFill>
+          <a:noFill/>
+          <a:ln>
+            <a:noFill/>
+          </a:ln>
         </p:spPr>
         <p:txBody>
-          <a:bodyPr wrap="none" rtlCol="0">
+          <a:bodyPr wrap="square" rtlCol="0">
             <a:spAutoFit/>
           </a:bodyPr>
           <a:lstStyle/>
@@ -7565,9 +7660,6 @@
                 <a:ln>
                   <a:noFill/>
                 </a:ln>
-                <a:solidFill>
-                  <a:prstClr val="black"/>
-                </a:solidFill>
                 <a:effectLst/>
                 <a:uLnTx/>
                 <a:uFillTx/>
@@ -7582,9 +7674,6 @@
                 <a:ln>
                   <a:noFill/>
                 </a:ln>
-                <a:solidFill>
-                  <a:prstClr val="black"/>
-                </a:solidFill>
                 <a:effectLst/>
                 <a:uLnTx/>
                 <a:uFillTx/>
@@ -7599,9 +7688,6 @@
                 <a:ln>
                   <a:noFill/>
                 </a:ln>
-                <a:solidFill>
-                  <a:prstClr val="black"/>
-                </a:solidFill>
                 <a:effectLst/>
                 <a:uLnTx/>
                 <a:uFillTx/>
@@ -7635,9 +7721,6 @@
                 <a:ln>
                   <a:noFill/>
                 </a:ln>
-                <a:solidFill>
-                  <a:prstClr val="black"/>
-                </a:solidFill>
                 <a:effectLst/>
                 <a:uLnTx/>
                 <a:uFillTx/>
@@ -7646,6 +7729,528 @@
                 <a:cs typeface="+mn-cs"/>
               </a:rPr>
               <a:t>founder &amp; CTO @ motus ml</a:t>
+            </a:r>
+          </a:p>
+          <a:p>
+            <a:pPr marL="0" marR="0" lvl="0" indent="0" algn="l" defTabSz="914400" rtl="0" eaLnBrk="1" fontAlgn="auto" latinLnBrk="0" hangingPunct="1">
+              <a:lnSpc>
+                <a:spcPct val="100000"/>
+              </a:lnSpc>
+              <a:spcBef>
+                <a:spcPts val="0"/>
+              </a:spcBef>
+              <a:spcAft>
+                <a:spcPts val="0"/>
+              </a:spcAft>
+              <a:buClrTx/>
+              <a:buSzTx/>
+              <a:buFontTx/>
+              <a:buNone/>
+              <a:tabLst/>
+              <a:defRPr/>
+            </a:pPr>
+            <a:endParaRPr lang="en-US" sz="1600" dirty="0">
+              <a:latin typeface="Lato" panose="020F0502020204030203" pitchFamily="34" charset="77"/>
+            </a:endParaRPr>
+          </a:p>
+          <a:p>
+            <a:pPr marL="0" marR="0" lvl="0" indent="0" algn="l" defTabSz="914400" rtl="0" eaLnBrk="1" fontAlgn="auto" latinLnBrk="0" hangingPunct="1">
+              <a:lnSpc>
+                <a:spcPct val="100000"/>
+              </a:lnSpc>
+              <a:spcBef>
+                <a:spcPts val="0"/>
+              </a:spcBef>
+              <a:spcAft>
+                <a:spcPts val="0"/>
+              </a:spcAft>
+              <a:buClrTx/>
+              <a:buSzTx/>
+              <a:buFontTx/>
+              <a:buNone/>
+              <a:tabLst/>
+              <a:defRPr/>
+            </a:pPr>
+            <a:r>
+              <a:rPr lang="en-US" sz="1600" dirty="0">
+                <a:latin typeface="Lato" panose="020F0502020204030203" pitchFamily="34" charset="77"/>
+              </a:rPr>
+              <a:t>Research in the </a:t>
+            </a:r>
+            <a:r>
+              <a:rPr lang="en-US" sz="1600" b="1" dirty="0">
+                <a:latin typeface="Lato" panose="020F0502020204030203" pitchFamily="34" charset="77"/>
+              </a:rPr>
+              <a:t>Streaming Machine Learning </a:t>
+            </a:r>
+            <a:r>
+              <a:rPr lang="en-US" sz="1600" dirty="0">
+                <a:latin typeface="Lato" panose="020F0502020204030203" pitchFamily="34" charset="77"/>
+              </a:rPr>
+              <a:t>field with evolving data streams, concept drifts, and class imbalance. +Focus on applying Streaming Machine Learning techniques in constrained environments at the </a:t>
+            </a:r>
+            <a:r>
+              <a:rPr lang="en-US" sz="1600" b="1" dirty="0">
+                <a:latin typeface="Lato" panose="020F0502020204030203" pitchFamily="34" charset="77"/>
+              </a:rPr>
+              <a:t>network's edge</a:t>
+            </a:r>
+            <a:endParaRPr lang="en-US" sz="1600" dirty="0">
+              <a:latin typeface="Lato" panose="020F0502020204030203" pitchFamily="34" charset="77"/>
+            </a:endParaRPr>
+          </a:p>
+        </p:txBody>
+      </p:sp>
+      <p:sp>
+        <p:nvSpPr>
+          <p:cNvPr id="9" name="TextBox 8">
+            <a:extLst>
+              <a:ext uri="{FF2B5EF4-FFF2-40B4-BE49-F238E27FC236}">
+                <a16:creationId xmlns:a16="http://schemas.microsoft.com/office/drawing/2014/main" id="{06D10D25-B80E-F920-09F9-6AF9495F9CB7}"/>
+              </a:ext>
+            </a:extLst>
+          </p:cNvPr>
+          <p:cNvSpPr txBox="1"/>
+          <p:nvPr/>
+        </p:nvSpPr>
+        <p:spPr>
+          <a:xfrm>
+            <a:off x="4495800" y="3485363"/>
+            <a:ext cx="2664512" cy="400110"/>
+          </a:xfrm>
+          <a:prstGeom prst="rect">
+            <a:avLst/>
+          </a:prstGeom>
+          <a:noFill/>
+          <a:ln>
+            <a:noFill/>
+          </a:ln>
+        </p:spPr>
+        <p:txBody>
+          <a:bodyPr wrap="none" rtlCol="0">
+            <a:spAutoFit/>
+          </a:bodyPr>
+          <a:lstStyle/>
+          <a:p>
+            <a:pPr marL="0" marR="0" lvl="0" indent="0" algn="l" defTabSz="914400" rtl="0" eaLnBrk="1" fontAlgn="auto" latinLnBrk="0" hangingPunct="1">
+              <a:lnSpc>
+                <a:spcPct val="100000"/>
+              </a:lnSpc>
+              <a:spcBef>
+                <a:spcPts val="0"/>
+              </a:spcBef>
+              <a:spcAft>
+                <a:spcPts val="0"/>
+              </a:spcAft>
+              <a:buClrTx/>
+              <a:buSzTx/>
+              <a:buFontTx/>
+              <a:buNone/>
+              <a:tabLst/>
+              <a:defRPr/>
+            </a:pPr>
+            <a:r>
+              <a:rPr kumimoji="0" lang="en-US" sz="2000" b="1" i="0" u="none" strike="noStrike" kern="1200" cap="none" spc="0" normalizeH="0" baseline="0" noProof="0" dirty="0">
+                <a:ln>
+                  <a:noFill/>
+                </a:ln>
+                <a:effectLst/>
+                <a:uLnTx/>
+                <a:uFillTx/>
+                <a:latin typeface="Lato" panose="020F0502020204030203" pitchFamily="34" charset="77"/>
+                <a:ea typeface="+mn-ea"/>
+                <a:cs typeface="+mn-cs"/>
+              </a:rPr>
+              <a:t>Federico Giannini, Dr.</a:t>
+            </a:r>
+          </a:p>
+        </p:txBody>
+      </p:sp>
+      <p:sp>
+        <p:nvSpPr>
+          <p:cNvPr id="10" name="TextBox 9">
+            <a:extLst>
+              <a:ext uri="{FF2B5EF4-FFF2-40B4-BE49-F238E27FC236}">
+                <a16:creationId xmlns:a16="http://schemas.microsoft.com/office/drawing/2014/main" id="{793C79EE-32CA-9179-66EA-E458DD4D585B}"/>
+              </a:ext>
+            </a:extLst>
+          </p:cNvPr>
+          <p:cNvSpPr txBox="1"/>
+          <p:nvPr/>
+        </p:nvSpPr>
+        <p:spPr>
+          <a:xfrm>
+            <a:off x="4512733" y="3846051"/>
+            <a:ext cx="3570563" cy="2554545"/>
+          </a:xfrm>
+          <a:prstGeom prst="rect">
+            <a:avLst/>
+          </a:prstGeom>
+          <a:noFill/>
+          <a:ln>
+            <a:noFill/>
+          </a:ln>
+        </p:spPr>
+        <p:txBody>
+          <a:bodyPr wrap="square" rtlCol="0">
+            <a:spAutoFit/>
+          </a:bodyPr>
+          <a:lstStyle/>
+          <a:p>
+            <a:pPr marL="0" marR="0" lvl="0" indent="0" algn="l" defTabSz="914400" rtl="0" eaLnBrk="1" fontAlgn="auto" latinLnBrk="0" hangingPunct="1">
+              <a:lnSpc>
+                <a:spcPct val="100000"/>
+              </a:lnSpc>
+              <a:spcBef>
+                <a:spcPts val="0"/>
+              </a:spcBef>
+              <a:spcAft>
+                <a:spcPts val="0"/>
+              </a:spcAft>
+              <a:buClrTx/>
+              <a:buSzTx/>
+              <a:buFontTx/>
+              <a:buNone/>
+              <a:tabLst/>
+              <a:defRPr/>
+            </a:pPr>
+            <a:r>
+              <a:rPr kumimoji="0" lang="en-US" sz="1600" i="0" u="none" strike="noStrike" kern="1200" cap="none" spc="0" normalizeH="0" baseline="0" noProof="0" dirty="0">
+                <a:ln>
+                  <a:noFill/>
+                </a:ln>
+                <a:effectLst/>
+                <a:uLnTx/>
+                <a:uFillTx/>
+                <a:latin typeface="Lato" panose="020F0502020204030203" pitchFamily="34" charset="77"/>
+                <a:ea typeface="+mn-ea"/>
+                <a:cs typeface="+mn-cs"/>
+              </a:rPr>
+              <a:t>PhD student @ </a:t>
+            </a:r>
+            <a:r>
+              <a:rPr kumimoji="0" lang="en-US" sz="1600" i="0" u="none" strike="noStrike" kern="1200" cap="none" spc="0" normalizeH="0" baseline="0" noProof="0" dirty="0" err="1">
+                <a:ln>
+                  <a:noFill/>
+                </a:ln>
+                <a:effectLst/>
+                <a:uLnTx/>
+                <a:uFillTx/>
+                <a:latin typeface="Lato" panose="020F0502020204030203" pitchFamily="34" charset="77"/>
+                <a:ea typeface="+mn-ea"/>
+                <a:cs typeface="+mn-cs"/>
+              </a:rPr>
+              <a:t>Politecnico</a:t>
+            </a:r>
+            <a:r>
+              <a:rPr kumimoji="0" lang="en-US" sz="1600" i="0" u="none" strike="noStrike" kern="1200" cap="none" spc="0" normalizeH="0" baseline="0" noProof="0" dirty="0">
+                <a:ln>
+                  <a:noFill/>
+                </a:ln>
+                <a:effectLst/>
+                <a:uLnTx/>
+                <a:uFillTx/>
+                <a:latin typeface="Lato" panose="020F0502020204030203" pitchFamily="34" charset="77"/>
+                <a:ea typeface="+mn-ea"/>
+                <a:cs typeface="+mn-cs"/>
+              </a:rPr>
+              <a:t> di Milano</a:t>
+            </a:r>
+            <a:br>
+              <a:rPr kumimoji="0" lang="en-US" sz="1600" i="0" u="none" strike="noStrike" kern="1200" cap="none" spc="0" normalizeH="0" baseline="0" noProof="0" dirty="0">
+                <a:ln>
+                  <a:noFill/>
+                </a:ln>
+                <a:effectLst/>
+                <a:uLnTx/>
+                <a:uFillTx/>
+                <a:latin typeface="Lato" panose="020F0502020204030203" pitchFamily="34" charset="77"/>
+                <a:ea typeface="+mn-ea"/>
+                <a:cs typeface="+mn-cs"/>
+              </a:rPr>
+            </a:br>
+            <a:endParaRPr kumimoji="0" lang="en-US" sz="1600" i="0" u="none" strike="noStrike" kern="1200" cap="none" spc="0" normalizeH="0" baseline="0" noProof="0" dirty="0">
+              <a:ln>
+                <a:noFill/>
+              </a:ln>
+              <a:effectLst/>
+              <a:uLnTx/>
+              <a:uFillTx/>
+              <a:latin typeface="Lato" panose="020F0502020204030203" pitchFamily="34" charset="77"/>
+              <a:ea typeface="+mn-ea"/>
+              <a:cs typeface="+mn-cs"/>
+            </a:endParaRPr>
+          </a:p>
+          <a:p>
+            <a:pPr marL="0" marR="0" lvl="0" indent="0" algn="l" defTabSz="914400" rtl="0" eaLnBrk="1" fontAlgn="auto" latinLnBrk="0" hangingPunct="1">
+              <a:lnSpc>
+                <a:spcPct val="100000"/>
+              </a:lnSpc>
+              <a:spcBef>
+                <a:spcPts val="0"/>
+              </a:spcBef>
+              <a:spcAft>
+                <a:spcPts val="0"/>
+              </a:spcAft>
+              <a:buClrTx/>
+              <a:buSzTx/>
+              <a:buFontTx/>
+              <a:buNone/>
+              <a:tabLst/>
+              <a:defRPr/>
+            </a:pPr>
+            <a:endParaRPr lang="en-US" sz="1600" dirty="0">
+              <a:latin typeface="Lato" panose="020F0502020204030203" pitchFamily="34" charset="77"/>
+            </a:endParaRPr>
+          </a:p>
+          <a:p>
+            <a:pPr marL="0" marR="0" lvl="0" indent="0" algn="l" defTabSz="914400" rtl="0" eaLnBrk="1" fontAlgn="auto" latinLnBrk="0" hangingPunct="1">
+              <a:lnSpc>
+                <a:spcPct val="100000"/>
+              </a:lnSpc>
+              <a:spcBef>
+                <a:spcPts val="0"/>
+              </a:spcBef>
+              <a:spcAft>
+                <a:spcPts val="0"/>
+              </a:spcAft>
+              <a:buClrTx/>
+              <a:buSzTx/>
+              <a:buFontTx/>
+              <a:buNone/>
+              <a:tabLst/>
+              <a:defRPr/>
+            </a:pPr>
+            <a:r>
+              <a:rPr lang="en-US" sz="1600" dirty="0">
+                <a:latin typeface="Lato" panose="020F0502020204030203" pitchFamily="34" charset="77"/>
+              </a:rPr>
+              <a:t>Researcher in the Streaming Machine Learning and </a:t>
+            </a:r>
+            <a:r>
+              <a:rPr lang="en-US" sz="1600" b="1" dirty="0">
+                <a:latin typeface="Lato" panose="020F0502020204030203" pitchFamily="34" charset="77"/>
+              </a:rPr>
+              <a:t>Continual Learning </a:t>
+            </a:r>
+            <a:r>
+              <a:rPr lang="en-US" sz="1600" dirty="0">
+                <a:latin typeface="Lato" panose="020F0502020204030203" pitchFamily="34" charset="77"/>
+              </a:rPr>
+              <a:t>fields. Focus on applying Deep Learning techniques to data streams to address concept drifts, temporal dependence, and catastrophic forgetting</a:t>
+            </a:r>
+          </a:p>
+        </p:txBody>
+      </p:sp>
+      <p:sp>
+        <p:nvSpPr>
+          <p:cNvPr id="12" name="TextBox 11">
+            <a:extLst>
+              <a:ext uri="{FF2B5EF4-FFF2-40B4-BE49-F238E27FC236}">
+                <a16:creationId xmlns:a16="http://schemas.microsoft.com/office/drawing/2014/main" id="{8105B42F-3E6C-5086-8E9D-A285EDD7C5CE}"/>
+              </a:ext>
+            </a:extLst>
+          </p:cNvPr>
+          <p:cNvSpPr txBox="1"/>
+          <p:nvPr/>
+        </p:nvSpPr>
+        <p:spPr>
+          <a:xfrm>
+            <a:off x="8206901" y="3485363"/>
+            <a:ext cx="2372765" cy="400110"/>
+          </a:xfrm>
+          <a:prstGeom prst="rect">
+            <a:avLst/>
+          </a:prstGeom>
+          <a:noFill/>
+          <a:ln>
+            <a:noFill/>
+          </a:ln>
+        </p:spPr>
+        <p:txBody>
+          <a:bodyPr wrap="none" rtlCol="0">
+            <a:spAutoFit/>
+          </a:bodyPr>
+          <a:lstStyle/>
+          <a:p>
+            <a:pPr marL="0" marR="0" lvl="0" indent="0" algn="l" defTabSz="914400" rtl="0" eaLnBrk="1" fontAlgn="auto" latinLnBrk="0" hangingPunct="1">
+              <a:lnSpc>
+                <a:spcPct val="100000"/>
+              </a:lnSpc>
+              <a:spcBef>
+                <a:spcPts val="0"/>
+              </a:spcBef>
+              <a:spcAft>
+                <a:spcPts val="0"/>
+              </a:spcAft>
+              <a:buClrTx/>
+              <a:buSzTx/>
+              <a:buFontTx/>
+              <a:buNone/>
+              <a:tabLst/>
+              <a:defRPr/>
+            </a:pPr>
+            <a:r>
+              <a:rPr kumimoji="0" lang="en-US" sz="2000" b="1" i="0" u="none" strike="noStrike" kern="1200" cap="none" spc="0" normalizeH="0" baseline="0" noProof="0" dirty="0">
+                <a:ln>
+                  <a:noFill/>
+                </a:ln>
+                <a:effectLst/>
+                <a:uLnTx/>
+                <a:uFillTx/>
+                <a:latin typeface="Lato" panose="020F0502020204030203" pitchFamily="34" charset="77"/>
+                <a:ea typeface="+mn-ea"/>
+                <a:cs typeface="+mn-cs"/>
+              </a:rPr>
+              <a:t>Giacomo Ziffer, Dr.</a:t>
+            </a:r>
+          </a:p>
+        </p:txBody>
+      </p:sp>
+      <p:sp>
+        <p:nvSpPr>
+          <p:cNvPr id="13" name="TextBox 12">
+            <a:extLst>
+              <a:ext uri="{FF2B5EF4-FFF2-40B4-BE49-F238E27FC236}">
+                <a16:creationId xmlns:a16="http://schemas.microsoft.com/office/drawing/2014/main" id="{9846FB1D-D402-F321-6E4C-4092C16023A6}"/>
+              </a:ext>
+            </a:extLst>
+          </p:cNvPr>
+          <p:cNvSpPr txBox="1"/>
+          <p:nvPr/>
+        </p:nvSpPr>
+        <p:spPr>
+          <a:xfrm>
+            <a:off x="8223835" y="3846051"/>
+            <a:ext cx="3748709" cy="2308324"/>
+          </a:xfrm>
+          <a:prstGeom prst="rect">
+            <a:avLst/>
+          </a:prstGeom>
+          <a:noFill/>
+          <a:ln>
+            <a:noFill/>
+          </a:ln>
+        </p:spPr>
+        <p:txBody>
+          <a:bodyPr wrap="square" rtlCol="0">
+            <a:spAutoFit/>
+          </a:bodyPr>
+          <a:lstStyle/>
+          <a:p>
+            <a:pPr marL="0" marR="0" lvl="0" indent="0" algn="l" defTabSz="914400" rtl="0" eaLnBrk="1" fontAlgn="auto" latinLnBrk="0" hangingPunct="1">
+              <a:lnSpc>
+                <a:spcPct val="100000"/>
+              </a:lnSpc>
+              <a:spcBef>
+                <a:spcPts val="0"/>
+              </a:spcBef>
+              <a:spcAft>
+                <a:spcPts val="0"/>
+              </a:spcAft>
+              <a:buClrTx/>
+              <a:buSzTx/>
+              <a:buFontTx/>
+              <a:buNone/>
+              <a:tabLst/>
+              <a:defRPr/>
+            </a:pPr>
+            <a:r>
+              <a:rPr lang="en-US" sz="1600" dirty="0">
+                <a:solidFill>
+                  <a:prstClr val="black"/>
+                </a:solidFill>
+                <a:latin typeface="Lato" panose="020F0502020204030203" pitchFamily="34" charset="77"/>
+              </a:rPr>
+              <a:t>PhD student</a:t>
+            </a:r>
+            <a:r>
+              <a:rPr kumimoji="0" lang="en-US" sz="1600" i="0" u="none" strike="noStrike" kern="1200" cap="none" spc="0" normalizeH="0" baseline="0" noProof="0" dirty="0">
+                <a:ln>
+                  <a:noFill/>
+                </a:ln>
+                <a:solidFill>
+                  <a:prstClr val="black"/>
+                </a:solidFill>
+                <a:effectLst/>
+                <a:uLnTx/>
+                <a:uFillTx/>
+                <a:latin typeface="Lato" panose="020F0502020204030203" pitchFamily="34" charset="77"/>
+                <a:ea typeface="+mn-ea"/>
+                <a:cs typeface="+mn-cs"/>
+              </a:rPr>
+              <a:t> @ </a:t>
+            </a:r>
+            <a:r>
+              <a:rPr kumimoji="0" lang="en-US" sz="1600" i="0" u="none" strike="noStrike" kern="1200" cap="none" spc="0" normalizeH="0" baseline="0" noProof="0" dirty="0" err="1">
+                <a:ln>
+                  <a:noFill/>
+                </a:ln>
+                <a:solidFill>
+                  <a:prstClr val="black"/>
+                </a:solidFill>
+                <a:effectLst/>
+                <a:uLnTx/>
+                <a:uFillTx/>
+                <a:latin typeface="Lato" panose="020F0502020204030203" pitchFamily="34" charset="77"/>
+                <a:ea typeface="+mn-ea"/>
+                <a:cs typeface="+mn-cs"/>
+              </a:rPr>
+              <a:t>Politecnico</a:t>
+            </a:r>
+            <a:r>
+              <a:rPr kumimoji="0" lang="en-US" sz="1600" i="0" u="none" strike="noStrike" kern="1200" cap="none" spc="0" normalizeH="0" baseline="0" noProof="0" dirty="0">
+                <a:ln>
+                  <a:noFill/>
+                </a:ln>
+                <a:solidFill>
+                  <a:prstClr val="black"/>
+                </a:solidFill>
+                <a:effectLst/>
+                <a:uLnTx/>
+                <a:uFillTx/>
+                <a:latin typeface="Lato" panose="020F0502020204030203" pitchFamily="34" charset="77"/>
+                <a:ea typeface="+mn-ea"/>
+                <a:cs typeface="+mn-cs"/>
+              </a:rPr>
+              <a:t> di Milano</a:t>
+            </a:r>
+          </a:p>
+          <a:p>
+            <a:pPr marL="0" marR="0" lvl="0" indent="0" algn="l" defTabSz="914400" rtl="0" eaLnBrk="1" fontAlgn="auto" latinLnBrk="0" hangingPunct="1">
+              <a:lnSpc>
+                <a:spcPct val="100000"/>
+              </a:lnSpc>
+              <a:spcBef>
+                <a:spcPts val="0"/>
+              </a:spcBef>
+              <a:spcAft>
+                <a:spcPts val="0"/>
+              </a:spcAft>
+              <a:buClrTx/>
+              <a:buSzTx/>
+              <a:buFontTx/>
+              <a:buNone/>
+              <a:tabLst/>
+              <a:defRPr/>
+            </a:pPr>
+            <a:r>
+              <a:rPr kumimoji="0" lang="en-US" sz="1600" i="0" u="none" strike="noStrike" kern="1200" cap="none" spc="0" normalizeH="0" baseline="0" noProof="0" dirty="0">
+                <a:ln>
+                  <a:noFill/>
+                </a:ln>
+                <a:solidFill>
+                  <a:prstClr val="black"/>
+                </a:solidFill>
+                <a:effectLst/>
+                <a:uLnTx/>
+                <a:uFillTx/>
+                <a:latin typeface="Lato" panose="020F0502020204030203" pitchFamily="34" charset="77"/>
+                <a:ea typeface="+mn-ea"/>
+                <a:cs typeface="+mn-cs"/>
+              </a:rPr>
+              <a:t>founder &amp; CEO @ motus ml</a:t>
             </a:r>
           </a:p>
           <a:p>
@@ -7693,694 +8298,113 @@
             </a:pPr>
             <a:r>
               <a:rPr lang="en-US" sz="1600" dirty="0">
-                <a:solidFill>
-                  <a:srgbClr val="FF0000"/>
-                </a:solidFill>
                 <a:latin typeface="Lato" panose="020F0502020204030203" pitchFamily="34" charset="77"/>
               </a:rPr>
-              <a:t>TBC</a:t>
+              <a:t>Researcher in the </a:t>
+            </a:r>
+            <a:r>
+              <a:rPr lang="en-US" sz="1600" b="1" dirty="0">
+                <a:latin typeface="Lato" panose="020F0502020204030203" pitchFamily="34" charset="77"/>
+              </a:rPr>
+              <a:t>Time-Evolving Analytics</a:t>
+            </a:r>
+            <a:r>
+              <a:rPr lang="en-US" sz="1600" dirty="0">
+                <a:latin typeface="Lato" panose="020F0502020204030203" pitchFamily="34" charset="77"/>
+              </a:rPr>
+              <a:t> field, focusing on applying Streaming Machine Learning techniques to (un)structured data streams with concept drifts and temporal dependence</a:t>
             </a:r>
           </a:p>
         </p:txBody>
       </p:sp>
       <p:pic>
         <p:nvPicPr>
-          <p:cNvPr id="8" name="Picture 2" descr="Emanuele Della Valle's photo">
+          <p:cNvPr id="15" name="Picture 14">
             <a:extLst>
               <a:ext uri="{FF2B5EF4-FFF2-40B4-BE49-F238E27FC236}">
-                <a16:creationId xmlns:a16="http://schemas.microsoft.com/office/drawing/2014/main" id="{2149C38B-0B40-8C9B-7BFC-E3FE54EAF806}"/>
+                <a16:creationId xmlns:a16="http://schemas.microsoft.com/office/drawing/2014/main" id="{8BD07FC1-E503-389E-205A-1E5FFFE6FAF2}"/>
               </a:ext>
             </a:extLst>
           </p:cNvPr>
           <p:cNvPicPr>
-            <a:picLocks noChangeAspect="1" noChangeArrowheads="1"/>
+            <a:picLocks noChangeAspect="1"/>
           </p:cNvPicPr>
           <p:nvPr/>
         </p:nvPicPr>
         <p:blipFill>
-          <a:blip r:embed="rId3">
-            <a:extLst>
-              <a:ext uri="{28A0092B-C50C-407E-A947-70E740481C1C}">
-                <a14:useLocalDpi xmlns:a14="http://schemas.microsoft.com/office/drawing/2010/main" val="0"/>
-              </a:ext>
-            </a:extLst>
-          </a:blip>
-          <a:srcRect/>
+          <a:blip r:embed="rId3"/>
           <a:stretch>
             <a:fillRect/>
           </a:stretch>
         </p:blipFill>
-        <p:spPr bwMode="auto">
+        <p:spPr>
           <a:xfrm>
-            <a:off x="892225" y="2024419"/>
-            <a:ext cx="1968461" cy="1968461"/>
+            <a:off x="8260927" y="1473391"/>
+            <a:ext cx="1968462" cy="1968462"/>
           </a:xfrm>
           <a:prstGeom prst="rect">
             <a:avLst/>
           </a:prstGeom>
-          <a:noFill/>
-          <a:extLst>
-            <a:ext uri="{909E8E84-426E-40DD-AFC4-6F175D3DCCD1}">
-              <a14:hiddenFill xmlns:a14="http://schemas.microsoft.com/office/drawing/2010/main">
-                <a:solidFill>
-                  <a:srgbClr val="FFFFFF"/>
-                </a:solidFill>
-              </a14:hiddenFill>
-            </a:ext>
-          </a:extLst>
         </p:spPr>
       </p:pic>
-      <p:sp>
-        <p:nvSpPr>
-          <p:cNvPr id="2" name="Footer Placeholder 1">
+      <p:pic>
+        <p:nvPicPr>
+          <p:cNvPr id="19" name="Picture 18">
             <a:extLst>
               <a:ext uri="{FF2B5EF4-FFF2-40B4-BE49-F238E27FC236}">
-                <a16:creationId xmlns:a16="http://schemas.microsoft.com/office/drawing/2014/main" id="{E4684030-D19C-D50C-0EF2-2B039C904C99}"/>
+                <a16:creationId xmlns:a16="http://schemas.microsoft.com/office/drawing/2014/main" id="{BD7C10D5-43C1-AF11-1939-DF472C8AA539}"/>
               </a:ext>
             </a:extLst>
           </p:cNvPr>
-          <p:cNvSpPr>
-            <a:spLocks noGrp="1"/>
-          </p:cNvSpPr>
-          <p:nvPr>
-            <p:ph type="ftr" sz="quarter" idx="10"/>
-          </p:nvPr>
-        </p:nvSpPr>
-        <p:spPr/>
-        <p:txBody>
-          <a:bodyPr/>
-          <a:lstStyle/>
-          <a:p>
-            <a:r>
-              <a:rPr lang="it-IT"/>
-              <a:t>Emanuele Della Valle - http://emanueledellavalle.org</a:t>
-            </a:r>
-            <a:endParaRPr lang="it-IT" dirty="0"/>
-          </a:p>
-        </p:txBody>
-      </p:sp>
-      <p:sp>
-        <p:nvSpPr>
-          <p:cNvPr id="3" name="Slide Number Placeholder 2">
-            <a:extLst>
-              <a:ext uri="{FF2B5EF4-FFF2-40B4-BE49-F238E27FC236}">
-                <a16:creationId xmlns:a16="http://schemas.microsoft.com/office/drawing/2014/main" id="{BD819743-D372-A259-D37C-10FF04E04D5D}"/>
-              </a:ext>
-            </a:extLst>
-          </p:cNvPr>
-          <p:cNvSpPr>
-            <a:spLocks noGrp="1"/>
-          </p:cNvSpPr>
-          <p:nvPr>
-            <p:ph type="sldNum" sz="quarter" idx="11"/>
-          </p:nvPr>
-        </p:nvSpPr>
-        <p:spPr/>
-        <p:txBody>
-          <a:bodyPr/>
-          <a:lstStyle/>
-          <a:p>
-            <a:fld id="{0365D038-E70F-B244-A1AE-4DC4A8F32122}" type="slidenum">
-              <a:rPr lang="it-IT" smtClean="0"/>
-              <a:t>3</a:t>
-            </a:fld>
-            <a:endParaRPr lang="it-IT" dirty="0"/>
-          </a:p>
-        </p:txBody>
-      </p:sp>
-      <p:sp>
-        <p:nvSpPr>
-          <p:cNvPr id="9" name="TextBox 8">
-            <a:extLst>
-              <a:ext uri="{FF2B5EF4-FFF2-40B4-BE49-F238E27FC236}">
-                <a16:creationId xmlns:a16="http://schemas.microsoft.com/office/drawing/2014/main" id="{06D10D25-B80E-F920-09F9-6AF9495F9CB7}"/>
-              </a:ext>
-            </a:extLst>
-          </p:cNvPr>
-          <p:cNvSpPr txBox="1"/>
+          <p:cNvPicPr>
+            <a:picLocks noChangeAspect="1"/>
+          </p:cNvPicPr>
           <p:nvPr/>
-        </p:nvSpPr>
+        </p:nvPicPr>
+        <p:blipFill>
+          <a:blip r:embed="rId4"/>
+          <a:stretch>
+            <a:fillRect/>
+          </a:stretch>
+        </p:blipFill>
         <p:spPr>
           <a:xfrm>
-            <a:off x="4495800" y="4326611"/>
-            <a:ext cx="2664512" cy="400110"/>
+            <a:off x="892224" y="1473391"/>
+            <a:ext cx="1777823" cy="2014866"/>
           </a:xfrm>
           <a:prstGeom prst="rect">
             <a:avLst/>
           </a:prstGeom>
-          <a:solidFill>
-            <a:srgbClr val="FFFF00"/>
-          </a:solidFill>
         </p:spPr>
-        <p:txBody>
-          <a:bodyPr wrap="none" rtlCol="0">
-            <a:spAutoFit/>
-          </a:bodyPr>
-          <a:lstStyle/>
-          <a:p>
-            <a:pPr marL="0" marR="0" lvl="0" indent="0" algn="l" defTabSz="914400" rtl="0" eaLnBrk="1" fontAlgn="auto" latinLnBrk="0" hangingPunct="1">
-              <a:lnSpc>
-                <a:spcPct val="100000"/>
-              </a:lnSpc>
-              <a:spcBef>
-                <a:spcPts val="0"/>
-              </a:spcBef>
-              <a:spcAft>
-                <a:spcPts val="0"/>
-              </a:spcAft>
-              <a:buClrTx/>
-              <a:buSzTx/>
-              <a:buFontTx/>
-              <a:buNone/>
-              <a:tabLst/>
-              <a:defRPr/>
-            </a:pPr>
-            <a:r>
-              <a:rPr kumimoji="0" lang="en-US" sz="2000" b="1" i="0" u="none" strike="noStrike" kern="1200" cap="none" spc="0" normalizeH="0" baseline="0" noProof="0" dirty="0">
-                <a:ln>
-                  <a:noFill/>
-                </a:ln>
-                <a:effectLst/>
-                <a:uLnTx/>
-                <a:uFillTx/>
-                <a:latin typeface="Lato" panose="020F0502020204030203" pitchFamily="34" charset="77"/>
-                <a:ea typeface="+mn-ea"/>
-                <a:cs typeface="+mn-cs"/>
-              </a:rPr>
-              <a:t>Federico Giannini, Dr.</a:t>
-            </a:r>
-          </a:p>
-        </p:txBody>
-      </p:sp>
-      <p:sp>
-        <p:nvSpPr>
-          <p:cNvPr id="10" name="TextBox 9">
+      </p:pic>
+      <p:pic>
+        <p:nvPicPr>
+          <p:cNvPr id="20" name="Picture 19">
             <a:extLst>
               <a:ext uri="{FF2B5EF4-FFF2-40B4-BE49-F238E27FC236}">
-                <a16:creationId xmlns:a16="http://schemas.microsoft.com/office/drawing/2014/main" id="{793C79EE-32CA-9179-66EA-E458DD4D585B}"/>
+                <a16:creationId xmlns:a16="http://schemas.microsoft.com/office/drawing/2014/main" id="{9F894A83-D38A-BCF8-6A79-8C266945F6BC}"/>
               </a:ext>
             </a:extLst>
           </p:cNvPr>
-          <p:cNvSpPr txBox="1"/>
+          <p:cNvPicPr>
+            <a:picLocks noChangeAspect="1"/>
+          </p:cNvPicPr>
           <p:nvPr/>
-        </p:nvSpPr>
+        </p:nvPicPr>
+        <p:blipFill>
+          <a:blip r:embed="rId5"/>
+          <a:stretch>
+            <a:fillRect/>
+          </a:stretch>
+        </p:blipFill>
         <p:spPr>
           <a:xfrm>
-            <a:off x="4512733" y="4687299"/>
-            <a:ext cx="3485249" cy="830997"/>
+            <a:off x="4512277" y="1449532"/>
+            <a:ext cx="1566273" cy="2014866"/>
           </a:xfrm>
           <a:prstGeom prst="rect">
             <a:avLst/>
           </a:prstGeom>
-          <a:solidFill>
-            <a:srgbClr val="FFFF00"/>
-          </a:solidFill>
-        </p:spPr>
-        <p:txBody>
-          <a:bodyPr wrap="none" rtlCol="0">
-            <a:spAutoFit/>
-          </a:bodyPr>
-          <a:lstStyle/>
-          <a:p>
-            <a:pPr marL="0" marR="0" lvl="0" indent="0" algn="l" defTabSz="914400" rtl="0" eaLnBrk="1" fontAlgn="auto" latinLnBrk="0" hangingPunct="1">
-              <a:lnSpc>
-                <a:spcPct val="100000"/>
-              </a:lnSpc>
-              <a:spcBef>
-                <a:spcPts val="0"/>
-              </a:spcBef>
-              <a:spcAft>
-                <a:spcPts val="0"/>
-              </a:spcAft>
-              <a:buClrTx/>
-              <a:buSzTx/>
-              <a:buFontTx/>
-              <a:buNone/>
-              <a:tabLst/>
-              <a:defRPr/>
-            </a:pPr>
-            <a:r>
-              <a:rPr kumimoji="0" lang="en-US" sz="1600" i="0" u="none" strike="noStrike" kern="1200" cap="none" spc="0" normalizeH="0" baseline="0" noProof="0" dirty="0">
-                <a:ln>
-                  <a:noFill/>
-                </a:ln>
-                <a:solidFill>
-                  <a:prstClr val="black"/>
-                </a:solidFill>
-                <a:effectLst/>
-                <a:uLnTx/>
-                <a:uFillTx/>
-                <a:latin typeface="Lato" panose="020F0502020204030203" pitchFamily="34" charset="77"/>
-                <a:ea typeface="+mn-ea"/>
-                <a:cs typeface="+mn-cs"/>
-              </a:rPr>
-              <a:t>PhD student @ </a:t>
-            </a:r>
-            <a:r>
-              <a:rPr kumimoji="0" lang="en-US" sz="1600" i="0" u="none" strike="noStrike" kern="1200" cap="none" spc="0" normalizeH="0" baseline="0" noProof="0" dirty="0" err="1">
-                <a:ln>
-                  <a:noFill/>
-                </a:ln>
-                <a:solidFill>
-                  <a:prstClr val="black"/>
-                </a:solidFill>
-                <a:effectLst/>
-                <a:uLnTx/>
-                <a:uFillTx/>
-                <a:latin typeface="Lato" panose="020F0502020204030203" pitchFamily="34" charset="77"/>
-                <a:ea typeface="+mn-ea"/>
-                <a:cs typeface="+mn-cs"/>
-              </a:rPr>
-              <a:t>Politecnico</a:t>
-            </a:r>
-            <a:r>
-              <a:rPr kumimoji="0" lang="en-US" sz="1600" i="0" u="none" strike="noStrike" kern="1200" cap="none" spc="0" normalizeH="0" baseline="0" noProof="0" dirty="0">
-                <a:ln>
-                  <a:noFill/>
-                </a:ln>
-                <a:solidFill>
-                  <a:prstClr val="black"/>
-                </a:solidFill>
-                <a:effectLst/>
-                <a:uLnTx/>
-                <a:uFillTx/>
-                <a:latin typeface="Lato" panose="020F0502020204030203" pitchFamily="34" charset="77"/>
-                <a:ea typeface="+mn-ea"/>
-                <a:cs typeface="+mn-cs"/>
-              </a:rPr>
-              <a:t> di Milano</a:t>
-            </a:r>
-          </a:p>
-          <a:p>
-            <a:pPr marL="0" marR="0" lvl="0" indent="0" algn="l" defTabSz="914400" rtl="0" eaLnBrk="1" fontAlgn="auto" latinLnBrk="0" hangingPunct="1">
-              <a:lnSpc>
-                <a:spcPct val="100000"/>
-              </a:lnSpc>
-              <a:spcBef>
-                <a:spcPts val="0"/>
-              </a:spcBef>
-              <a:spcAft>
-                <a:spcPts val="0"/>
-              </a:spcAft>
-              <a:buClrTx/>
-              <a:buSzTx/>
-              <a:buFontTx/>
-              <a:buNone/>
-              <a:tabLst/>
-              <a:defRPr/>
-            </a:pPr>
-            <a:endParaRPr lang="en-US" sz="1600" dirty="0">
-              <a:solidFill>
-                <a:prstClr val="black"/>
-              </a:solidFill>
-              <a:latin typeface="Lato" panose="020F0502020204030203" pitchFamily="34" charset="77"/>
-            </a:endParaRPr>
-          </a:p>
-          <a:p>
-            <a:pPr marL="0" marR="0" lvl="0" indent="0" algn="l" defTabSz="914400" rtl="0" eaLnBrk="1" fontAlgn="auto" latinLnBrk="0" hangingPunct="1">
-              <a:lnSpc>
-                <a:spcPct val="100000"/>
-              </a:lnSpc>
-              <a:spcBef>
-                <a:spcPts val="0"/>
-              </a:spcBef>
-              <a:spcAft>
-                <a:spcPts val="0"/>
-              </a:spcAft>
-              <a:buClrTx/>
-              <a:buSzTx/>
-              <a:buFontTx/>
-              <a:buNone/>
-              <a:tabLst/>
-              <a:defRPr/>
-            </a:pPr>
-            <a:r>
-              <a:rPr lang="en-US" sz="1600" dirty="0">
-                <a:solidFill>
-                  <a:srgbClr val="FF0000"/>
-                </a:solidFill>
-                <a:latin typeface="Lato" panose="020F0502020204030203" pitchFamily="34" charset="77"/>
-              </a:rPr>
-              <a:t>TBC</a:t>
-            </a:r>
-          </a:p>
-        </p:txBody>
-      </p:sp>
-      <p:pic>
-        <p:nvPicPr>
-          <p:cNvPr id="11" name="Picture 2" descr="Emanuele Della Valle's photo">
-            <a:extLst>
-              <a:ext uri="{FF2B5EF4-FFF2-40B4-BE49-F238E27FC236}">
-                <a16:creationId xmlns:a16="http://schemas.microsoft.com/office/drawing/2014/main" id="{4A6C73FA-0D06-4B88-FF79-71BE480F4496}"/>
-              </a:ext>
-            </a:extLst>
-          </p:cNvPr>
-          <p:cNvPicPr>
-            <a:picLocks noChangeAspect="1" noChangeArrowheads="1"/>
-          </p:cNvPicPr>
-          <p:nvPr/>
-        </p:nvPicPr>
-        <p:blipFill>
-          <a:blip r:embed="rId3">
-            <a:extLst>
-              <a:ext uri="{28A0092B-C50C-407E-A947-70E740481C1C}">
-                <a14:useLocalDpi xmlns:a14="http://schemas.microsoft.com/office/drawing/2010/main" val="0"/>
-              </a:ext>
-            </a:extLst>
-          </a:blip>
-          <a:srcRect/>
-          <a:stretch>
-            <a:fillRect/>
-          </a:stretch>
-        </p:blipFill>
-        <p:spPr bwMode="auto">
-          <a:xfrm>
-            <a:off x="4549825" y="2024419"/>
-            <a:ext cx="1968461" cy="1968461"/>
-          </a:xfrm>
-          <a:prstGeom prst="rect">
-            <a:avLst/>
-          </a:prstGeom>
-          <a:noFill/>
-          <a:extLst>
-            <a:ext uri="{909E8E84-426E-40DD-AFC4-6F175D3DCCD1}">
-              <a14:hiddenFill xmlns:a14="http://schemas.microsoft.com/office/drawing/2010/main">
-                <a:solidFill>
-                  <a:srgbClr val="FFFFFF"/>
-                </a:solidFill>
-              </a14:hiddenFill>
-            </a:ext>
-          </a:extLst>
-        </p:spPr>
-      </p:pic>
-      <p:sp>
-        <p:nvSpPr>
-          <p:cNvPr id="12" name="TextBox 11">
-            <a:extLst>
-              <a:ext uri="{FF2B5EF4-FFF2-40B4-BE49-F238E27FC236}">
-                <a16:creationId xmlns:a16="http://schemas.microsoft.com/office/drawing/2014/main" id="{8105B42F-3E6C-5086-8E9D-A285EDD7C5CE}"/>
-              </a:ext>
-            </a:extLst>
-          </p:cNvPr>
-          <p:cNvSpPr txBox="1"/>
-          <p:nvPr/>
-        </p:nvSpPr>
-        <p:spPr>
-          <a:xfrm>
-            <a:off x="8206901" y="4326611"/>
-            <a:ext cx="2372765" cy="400110"/>
-          </a:xfrm>
-          <a:prstGeom prst="rect">
-            <a:avLst/>
-          </a:prstGeom>
-          <a:solidFill>
-            <a:srgbClr val="FFFF00"/>
-          </a:solidFill>
-        </p:spPr>
-        <p:txBody>
-          <a:bodyPr wrap="none" rtlCol="0">
-            <a:spAutoFit/>
-          </a:bodyPr>
-          <a:lstStyle/>
-          <a:p>
-            <a:pPr marL="0" marR="0" lvl="0" indent="0" algn="l" defTabSz="914400" rtl="0" eaLnBrk="1" fontAlgn="auto" latinLnBrk="0" hangingPunct="1">
-              <a:lnSpc>
-                <a:spcPct val="100000"/>
-              </a:lnSpc>
-              <a:spcBef>
-                <a:spcPts val="0"/>
-              </a:spcBef>
-              <a:spcAft>
-                <a:spcPts val="0"/>
-              </a:spcAft>
-              <a:buClrTx/>
-              <a:buSzTx/>
-              <a:buFontTx/>
-              <a:buNone/>
-              <a:tabLst/>
-              <a:defRPr/>
-            </a:pPr>
-            <a:r>
-              <a:rPr kumimoji="0" lang="en-US" sz="2000" b="1" i="0" u="none" strike="noStrike" kern="1200" cap="none" spc="0" normalizeH="0" baseline="0" noProof="0" dirty="0">
-                <a:ln>
-                  <a:noFill/>
-                </a:ln>
-                <a:effectLst/>
-                <a:uLnTx/>
-                <a:uFillTx/>
-                <a:latin typeface="Lato" panose="020F0502020204030203" pitchFamily="34" charset="77"/>
-                <a:ea typeface="+mn-ea"/>
-                <a:cs typeface="+mn-cs"/>
-              </a:rPr>
-              <a:t>Giacomo Ziffer, Dr.</a:t>
-            </a:r>
-          </a:p>
-        </p:txBody>
-      </p:sp>
-      <p:sp>
-        <p:nvSpPr>
-          <p:cNvPr id="13" name="TextBox 12">
-            <a:extLst>
-              <a:ext uri="{FF2B5EF4-FFF2-40B4-BE49-F238E27FC236}">
-                <a16:creationId xmlns:a16="http://schemas.microsoft.com/office/drawing/2014/main" id="{9846FB1D-D402-F321-6E4C-4092C16023A6}"/>
-              </a:ext>
-            </a:extLst>
-          </p:cNvPr>
-          <p:cNvSpPr txBox="1"/>
-          <p:nvPr/>
-        </p:nvSpPr>
-        <p:spPr>
-          <a:xfrm>
-            <a:off x="8223834" y="4687299"/>
-            <a:ext cx="3485249" cy="1077218"/>
-          </a:xfrm>
-          <a:prstGeom prst="rect">
-            <a:avLst/>
-          </a:prstGeom>
-          <a:solidFill>
-            <a:srgbClr val="FFFF00"/>
-          </a:solidFill>
-        </p:spPr>
-        <p:txBody>
-          <a:bodyPr wrap="none" rtlCol="0">
-            <a:spAutoFit/>
-          </a:bodyPr>
-          <a:lstStyle/>
-          <a:p>
-            <a:pPr marL="0" marR="0" lvl="0" indent="0" algn="l" defTabSz="914400" rtl="0" eaLnBrk="1" fontAlgn="auto" latinLnBrk="0" hangingPunct="1">
-              <a:lnSpc>
-                <a:spcPct val="100000"/>
-              </a:lnSpc>
-              <a:spcBef>
-                <a:spcPts val="0"/>
-              </a:spcBef>
-              <a:spcAft>
-                <a:spcPts val="0"/>
-              </a:spcAft>
-              <a:buClrTx/>
-              <a:buSzTx/>
-              <a:buFontTx/>
-              <a:buNone/>
-              <a:tabLst/>
-              <a:defRPr/>
-            </a:pPr>
-            <a:r>
-              <a:rPr lang="en-US" sz="1600" dirty="0">
-                <a:solidFill>
-                  <a:prstClr val="black"/>
-                </a:solidFill>
-                <a:latin typeface="Lato" panose="020F0502020204030203" pitchFamily="34" charset="77"/>
-              </a:rPr>
-              <a:t>PhD student</a:t>
-            </a:r>
-            <a:r>
-              <a:rPr kumimoji="0" lang="en-US" sz="1600" i="0" u="none" strike="noStrike" kern="1200" cap="none" spc="0" normalizeH="0" baseline="0" noProof="0" dirty="0">
-                <a:ln>
-                  <a:noFill/>
-                </a:ln>
-                <a:solidFill>
-                  <a:prstClr val="black"/>
-                </a:solidFill>
-                <a:effectLst/>
-                <a:uLnTx/>
-                <a:uFillTx/>
-                <a:latin typeface="Lato" panose="020F0502020204030203" pitchFamily="34" charset="77"/>
-                <a:ea typeface="+mn-ea"/>
-                <a:cs typeface="+mn-cs"/>
-              </a:rPr>
-              <a:t> @ </a:t>
-            </a:r>
-            <a:r>
-              <a:rPr kumimoji="0" lang="en-US" sz="1600" i="0" u="none" strike="noStrike" kern="1200" cap="none" spc="0" normalizeH="0" baseline="0" noProof="0" dirty="0" err="1">
-                <a:ln>
-                  <a:noFill/>
-                </a:ln>
-                <a:solidFill>
-                  <a:prstClr val="black"/>
-                </a:solidFill>
-                <a:effectLst/>
-                <a:uLnTx/>
-                <a:uFillTx/>
-                <a:latin typeface="Lato" panose="020F0502020204030203" pitchFamily="34" charset="77"/>
-                <a:ea typeface="+mn-ea"/>
-                <a:cs typeface="+mn-cs"/>
-              </a:rPr>
-              <a:t>Politecnico</a:t>
-            </a:r>
-            <a:r>
-              <a:rPr kumimoji="0" lang="en-US" sz="1600" i="0" u="none" strike="noStrike" kern="1200" cap="none" spc="0" normalizeH="0" baseline="0" noProof="0" dirty="0">
-                <a:ln>
-                  <a:noFill/>
-                </a:ln>
-                <a:solidFill>
-                  <a:prstClr val="black"/>
-                </a:solidFill>
-                <a:effectLst/>
-                <a:uLnTx/>
-                <a:uFillTx/>
-                <a:latin typeface="Lato" panose="020F0502020204030203" pitchFamily="34" charset="77"/>
-                <a:ea typeface="+mn-ea"/>
-                <a:cs typeface="+mn-cs"/>
-              </a:rPr>
-              <a:t> di Milano</a:t>
-            </a:r>
-          </a:p>
-          <a:p>
-            <a:pPr marL="0" marR="0" lvl="0" indent="0" algn="l" defTabSz="914400" rtl="0" eaLnBrk="1" fontAlgn="auto" latinLnBrk="0" hangingPunct="1">
-              <a:lnSpc>
-                <a:spcPct val="100000"/>
-              </a:lnSpc>
-              <a:spcBef>
-                <a:spcPts val="0"/>
-              </a:spcBef>
-              <a:spcAft>
-                <a:spcPts val="0"/>
-              </a:spcAft>
-              <a:buClrTx/>
-              <a:buSzTx/>
-              <a:buFontTx/>
-              <a:buNone/>
-              <a:tabLst/>
-              <a:defRPr/>
-            </a:pPr>
-            <a:r>
-              <a:rPr kumimoji="0" lang="en-US" sz="1600" i="0" u="none" strike="noStrike" kern="1200" cap="none" spc="0" normalizeH="0" baseline="0" noProof="0" dirty="0">
-                <a:ln>
-                  <a:noFill/>
-                </a:ln>
-                <a:solidFill>
-                  <a:prstClr val="black"/>
-                </a:solidFill>
-                <a:effectLst/>
-                <a:uLnTx/>
-                <a:uFillTx/>
-                <a:latin typeface="Lato" panose="020F0502020204030203" pitchFamily="34" charset="77"/>
-                <a:ea typeface="+mn-ea"/>
-                <a:cs typeface="+mn-cs"/>
-              </a:rPr>
-              <a:t>founder &amp; CEO @ motus ml</a:t>
-            </a:r>
-          </a:p>
-          <a:p>
-            <a:pPr marL="0" marR="0" lvl="0" indent="0" algn="l" defTabSz="914400" rtl="0" eaLnBrk="1" fontAlgn="auto" latinLnBrk="0" hangingPunct="1">
-              <a:lnSpc>
-                <a:spcPct val="100000"/>
-              </a:lnSpc>
-              <a:spcBef>
-                <a:spcPts val="0"/>
-              </a:spcBef>
-              <a:spcAft>
-                <a:spcPts val="0"/>
-              </a:spcAft>
-              <a:buClrTx/>
-              <a:buSzTx/>
-              <a:buFontTx/>
-              <a:buNone/>
-              <a:tabLst/>
-              <a:defRPr/>
-            </a:pPr>
-            <a:endParaRPr lang="en-US" sz="1600" dirty="0">
-              <a:solidFill>
-                <a:prstClr val="black"/>
-              </a:solidFill>
-              <a:latin typeface="Lato" panose="020F0502020204030203" pitchFamily="34" charset="77"/>
-            </a:endParaRPr>
-          </a:p>
-          <a:p>
-            <a:pPr marL="0" marR="0" lvl="0" indent="0" algn="l" defTabSz="914400" rtl="0" eaLnBrk="1" fontAlgn="auto" latinLnBrk="0" hangingPunct="1">
-              <a:lnSpc>
-                <a:spcPct val="100000"/>
-              </a:lnSpc>
-              <a:spcBef>
-                <a:spcPts val="0"/>
-              </a:spcBef>
-              <a:spcAft>
-                <a:spcPts val="0"/>
-              </a:spcAft>
-              <a:buClrTx/>
-              <a:buSzTx/>
-              <a:buFontTx/>
-              <a:buNone/>
-              <a:tabLst/>
-              <a:defRPr/>
-            </a:pPr>
-            <a:r>
-              <a:rPr lang="en-US" sz="1600" dirty="0">
-                <a:solidFill>
-                  <a:srgbClr val="FF0000"/>
-                </a:solidFill>
-                <a:latin typeface="Lato" panose="020F0502020204030203" pitchFamily="34" charset="77"/>
-              </a:rPr>
-              <a:t>TBC</a:t>
-            </a:r>
-          </a:p>
-        </p:txBody>
-      </p:sp>
-      <p:pic>
-        <p:nvPicPr>
-          <p:cNvPr id="14" name="Picture 2" descr="Emanuele Della Valle's photo">
-            <a:extLst>
-              <a:ext uri="{FF2B5EF4-FFF2-40B4-BE49-F238E27FC236}">
-                <a16:creationId xmlns:a16="http://schemas.microsoft.com/office/drawing/2014/main" id="{12309F69-A203-DE14-8DC8-F78DA214A437}"/>
-              </a:ext>
-            </a:extLst>
-          </p:cNvPr>
-          <p:cNvPicPr>
-            <a:picLocks noChangeAspect="1" noChangeArrowheads="1"/>
-          </p:cNvPicPr>
-          <p:nvPr/>
-        </p:nvPicPr>
-        <p:blipFill>
-          <a:blip r:embed="rId3">
-            <a:extLst>
-              <a:ext uri="{28A0092B-C50C-407E-A947-70E740481C1C}">
-                <a14:useLocalDpi xmlns:a14="http://schemas.microsoft.com/office/drawing/2010/main" val="0"/>
-              </a:ext>
-            </a:extLst>
-          </a:blip>
-          <a:srcRect/>
-          <a:stretch>
-            <a:fillRect/>
-          </a:stretch>
-        </p:blipFill>
-        <p:spPr bwMode="auto">
-          <a:xfrm>
-            <a:off x="8260926" y="2024419"/>
-            <a:ext cx="1968461" cy="1968461"/>
-          </a:xfrm>
-          <a:prstGeom prst="rect">
-            <a:avLst/>
-          </a:prstGeom>
-          <a:noFill/>
-          <a:extLst>
-            <a:ext uri="{909E8E84-426E-40DD-AFC4-6F175D3DCCD1}">
-              <a14:hiddenFill xmlns:a14="http://schemas.microsoft.com/office/drawing/2010/main">
-                <a:solidFill>
-                  <a:srgbClr val="FFFFFF"/>
-                </a:solidFill>
-              </a14:hiddenFill>
-            </a:ext>
-          </a:extLst>
         </p:spPr>
       </p:pic>
     </p:spTree>
@@ -8799,7 +8823,7 @@
                 <a:effectLst/>
                 <a:latin typeface="Helvetica" pitchFamily="2" charset="0"/>
               </a:rPr>
-              <a:t>Wednesday 14:15 - 16:15 in classroom 26.15 </a:t>
+              <a:t>Wednesday 14:15 - 16:15 in classroom 26.11 </a:t>
             </a:r>
           </a:p>
           <a:p>
@@ -8815,7 +8839,7 @@
                 <a:effectLst/>
                 <a:latin typeface="Helvetica" pitchFamily="2" charset="0"/>
               </a:rPr>
-              <a:t>Thursday 16:15 - 18:15 in classroom 2.1.2</a:t>
+              <a:t>Thursday 16:15 - 18:15 in classroom 3.0.3</a:t>
             </a:r>
           </a:p>
           <a:p>
@@ -8854,7 +8878,7 @@
                 <a:effectLst/>
                 <a:latin typeface="Helvetica" pitchFamily="2" charset="0"/>
               </a:rPr>
-              <a:t>Tuesday 14:30 - 16:00 in classroom 26.15  </a:t>
+              <a:t>Wednesday 14:30 - 16:00 in classroom 26.11  </a:t>
             </a:r>
           </a:p>
           <a:p>
@@ -8870,7 +8894,7 @@
                 <a:effectLst/>
                 <a:latin typeface="Helvetica" pitchFamily="2" charset="0"/>
               </a:rPr>
-              <a:t>Thursday 16:30 - 18:00 in classroom 2.1.2</a:t>
+              <a:t>Thursday 16:30 - 18:00 in classroom 3.0.3</a:t>
             </a:r>
           </a:p>
           <a:p>
@@ -8941,13 +8965,15 @@
               </a:rPr>
               <a:t>practice</a:t>
             </a:r>
-            <a:endParaRPr lang="en-GB" b="0" i="0" u="none" strike="noStrike" dirty="0">
-              <a:solidFill>
-                <a:srgbClr val="000000"/>
-              </a:solidFill>
-              <a:effectLst/>
-              <a:latin typeface="Helvetica" pitchFamily="2" charset="0"/>
-            </a:endParaRPr>
+            <a:r>
+              <a:rPr lang="en-GB" dirty="0">
+                <a:solidFill>
+                  <a:srgbClr val="000000"/>
+                </a:solidFill>
+                <a:latin typeface="Helvetica" pitchFamily="2" charset="0"/>
+              </a:rPr>
+              <a:t> </a:t>
+            </a:r>
           </a:p>
           <a:p>
             <a:pPr marL="742950" lvl="1" indent="-285750" algn="l">
@@ -9010,8 +9036,6 @@
               </a:rPr>
               <a:t> but I do not stream them</a:t>
             </a:r>
-          </a:p>
-          <a:p>
             <a:br>
               <a:rPr lang="en-GB" dirty="0"/>
             </a:br>
@@ -9701,9 +9725,7 @@
           </p:nvPr>
         </p:nvSpPr>
         <p:spPr>
-          <a:solidFill>
-            <a:srgbClr val="FFFF00"/>
-          </a:solidFill>
+          <a:noFill/>
         </p:spPr>
         <p:txBody>
           <a:bodyPr/>
@@ -9721,26 +9743,17 @@
                 <a:effectLst/>
                 <a:latin typeface="Helvetica" pitchFamily="2" charset="0"/>
               </a:rPr>
-              <a:t>From the foundations of </a:t>
-            </a:r>
-            <a:r>
-              <a:rPr lang="en-GB" b="1" i="0" u="none" strike="noStrike" dirty="0">
+              <a:t>From the foundations of Streaming Data Science </a:t>
+            </a:r>
+            <a:r>
+              <a:rPr lang="en-GB" i="0" u="none" strike="noStrike" dirty="0">
                 <a:solidFill>
                   <a:srgbClr val="000000"/>
                 </a:solidFill>
                 <a:effectLst/>
                 <a:latin typeface="Helvetica" pitchFamily="2" charset="0"/>
               </a:rPr>
-              <a:t>Streaming Machine Learning</a:t>
-            </a:r>
-            <a:r>
-              <a:rPr lang="en-GB" dirty="0">
-                <a:solidFill>
-                  <a:srgbClr val="000000"/>
-                </a:solidFill>
-                <a:latin typeface="Helvetica" pitchFamily="2" charset="0"/>
-              </a:rPr>
-              <a:t>,</a:t>
+              <a:t>to </a:t>
             </a:r>
             <a:r>
               <a:rPr lang="en-GB" b="0" i="0" u="none" strike="noStrike" dirty="0">
@@ -9750,8 +9763,205 @@
                 <a:effectLst/>
                 <a:latin typeface="Helvetica" pitchFamily="2" charset="0"/>
               </a:rPr>
-              <a:t> </a:t>
-            </a:r>
+              <a:t>real-world Python libraries</a:t>
+            </a:r>
+            <a:endParaRPr lang="en-GB" dirty="0">
+              <a:solidFill>
+                <a:srgbClr val="000000"/>
+              </a:solidFill>
+              <a:latin typeface="Helvetica" pitchFamily="2" charset="0"/>
+            </a:endParaRPr>
+          </a:p>
+          <a:p>
+            <a:r>
+              <a:rPr kumimoji="0" lang="en-GB" b="1" i="0" u="none" strike="noStrike" kern="1200" cap="none" spc="0" normalizeH="0" baseline="0" noProof="0" dirty="0">
+                <a:ln>
+                  <a:noFill/>
+                </a:ln>
+                <a:solidFill>
+                  <a:srgbClr val="000000"/>
+                </a:solidFill>
+                <a:effectLst/>
+                <a:uLnTx/>
+                <a:uFillTx/>
+                <a:latin typeface="Helvetica" pitchFamily="2" charset="0"/>
+                <a:ea typeface="+mn-ea"/>
+                <a:cs typeface="+mn-cs"/>
+              </a:rPr>
+              <a:t>Streaming Machine Learning </a:t>
+            </a:r>
+            <a:r>
+              <a:rPr lang="en-GB" dirty="0">
+                <a:solidFill>
+                  <a:srgbClr val="000000"/>
+                </a:solidFill>
+                <a:latin typeface="Helvetica" pitchFamily="2" charset="0"/>
+              </a:rPr>
+              <a:t>using </a:t>
+            </a:r>
+            <a:r>
+              <a:rPr lang="en-GB" dirty="0">
+                <a:solidFill>
+                  <a:srgbClr val="4183C4"/>
+                </a:solidFill>
+                <a:latin typeface="Helvetica" pitchFamily="2" charset="0"/>
+                <a:hlinkClick r:id="rId2">
+                  <a:extLst>
+                    <a:ext uri="{A12FA001-AC4F-418D-AE19-62706E023703}">
+                      <ahyp:hlinkClr xmlns:ahyp="http://schemas.microsoft.com/office/drawing/2018/hyperlinkcolor" val="tx"/>
+                    </a:ext>
+                  </a:extLst>
+                </a:hlinkClick>
+              </a:rPr>
+              <a:t>River</a:t>
+            </a:r>
+            <a:r>
+              <a:rPr lang="en-GB" dirty="0">
+                <a:solidFill>
+                  <a:srgbClr val="000000"/>
+                </a:solidFill>
+                <a:latin typeface="Helvetica" pitchFamily="2" charset="0"/>
+              </a:rPr>
+              <a:t> and </a:t>
+            </a:r>
+            <a:r>
+              <a:rPr kumimoji="0" lang="en-GB" b="0" i="0" u="none" strike="noStrike" kern="1200" cap="none" spc="0" normalizeH="0" baseline="0" noProof="0" dirty="0">
+                <a:ln>
+                  <a:noFill/>
+                </a:ln>
+                <a:solidFill>
+                  <a:srgbClr val="4183C4"/>
+                </a:solidFill>
+                <a:effectLst/>
+                <a:uLnTx/>
+                <a:uFillTx/>
+                <a:latin typeface="Helvetica" pitchFamily="2" charset="0"/>
+                <a:ea typeface="+mn-ea"/>
+                <a:cs typeface="+mn-cs"/>
+                <a:hlinkClick r:id="rId3"/>
+              </a:rPr>
+              <a:t>MOA</a:t>
+            </a:r>
+            <a:endParaRPr lang="en-GB" dirty="0">
+              <a:solidFill>
+                <a:srgbClr val="000000"/>
+              </a:solidFill>
+              <a:latin typeface="Helvetica" pitchFamily="2" charset="0"/>
+            </a:endParaRPr>
+          </a:p>
+          <a:p>
+            <a:r>
+              <a:rPr kumimoji="0" lang="en-GB" b="1" i="0" u="none" strike="noStrike" kern="1200" cap="none" spc="0" normalizeH="0" baseline="0" noProof="0" dirty="0">
+                <a:ln>
+                  <a:noFill/>
+                </a:ln>
+                <a:solidFill>
+                  <a:srgbClr val="000000"/>
+                </a:solidFill>
+                <a:effectLst/>
+                <a:uLnTx/>
+                <a:uFillTx/>
+                <a:latin typeface="Helvetica" pitchFamily="2" charset="0"/>
+                <a:ea typeface="+mn-ea"/>
+                <a:cs typeface="+mn-cs"/>
+              </a:rPr>
+              <a:t>Time Series Analytics</a:t>
+            </a:r>
+            <a:r>
+              <a:rPr kumimoji="0" lang="en-GB" b="0" i="0" u="none" strike="noStrike" kern="1200" cap="none" spc="0" normalizeH="0" baseline="0" noProof="0" dirty="0">
+                <a:ln>
+                  <a:noFill/>
+                </a:ln>
+                <a:solidFill>
+                  <a:srgbClr val="000000"/>
+                </a:solidFill>
+                <a:effectLst/>
+                <a:uLnTx/>
+                <a:uFillTx/>
+                <a:latin typeface="Helvetica" pitchFamily="2" charset="0"/>
+                <a:ea typeface="+mn-ea"/>
+                <a:cs typeface="+mn-cs"/>
+              </a:rPr>
+              <a:t> using </a:t>
+            </a:r>
+            <a:r>
+              <a:rPr kumimoji="0" lang="en-GB" b="0" i="0" u="none" strike="noStrike" kern="1200" cap="none" spc="0" normalizeH="0" baseline="0" noProof="0" dirty="0">
+                <a:ln>
+                  <a:noFill/>
+                </a:ln>
+                <a:solidFill>
+                  <a:prstClr val="black"/>
+                </a:solidFill>
+                <a:effectLst/>
+                <a:uLnTx/>
+                <a:uFillTx/>
+                <a:latin typeface="Helvetica" pitchFamily="2" charset="0"/>
+                <a:ea typeface="+mn-ea"/>
+                <a:cs typeface="+mn-cs"/>
+                <a:hlinkClick r:id="rId4"/>
+              </a:rPr>
+              <a:t>statsmodels.tsa</a:t>
+            </a:r>
+            <a:r>
+              <a:rPr kumimoji="0" lang="en-GB" b="0" i="0" u="none" strike="noStrike" kern="1200" cap="none" spc="0" normalizeH="0" baseline="0" noProof="0" dirty="0">
+                <a:ln>
+                  <a:noFill/>
+                </a:ln>
+                <a:solidFill>
+                  <a:srgbClr val="000000"/>
+                </a:solidFill>
+                <a:effectLst/>
+                <a:uLnTx/>
+                <a:uFillTx/>
+                <a:latin typeface="Helvetica" pitchFamily="2" charset="0"/>
+                <a:ea typeface="+mn-ea"/>
+                <a:cs typeface="+mn-cs"/>
+              </a:rPr>
+              <a:t>, and </a:t>
+            </a:r>
+            <a:r>
+              <a:rPr kumimoji="0" lang="en-GB" b="0" i="0" u="none" strike="noStrike" kern="1200" cap="none" spc="0" normalizeH="0" baseline="0" noProof="0" dirty="0">
+                <a:ln>
+                  <a:noFill/>
+                </a:ln>
+                <a:solidFill>
+                  <a:srgbClr val="000000"/>
+                </a:solidFill>
+                <a:effectLst/>
+                <a:uLnTx/>
+                <a:uFillTx/>
+                <a:latin typeface="Helvetica" pitchFamily="2" charset="0"/>
+                <a:ea typeface="+mn-ea"/>
+                <a:cs typeface="+mn-cs"/>
+                <a:hlinkClick r:id="rId5"/>
+              </a:rPr>
+              <a:t>darts</a:t>
+            </a:r>
+            <a:r>
+              <a:rPr kumimoji="0" lang="en-GB" b="0" i="0" u="none" strike="noStrike" kern="1200" cap="none" spc="0" normalizeH="0" baseline="0" noProof="0" dirty="0">
+                <a:ln>
+                  <a:noFill/>
+                </a:ln>
+                <a:solidFill>
+                  <a:srgbClr val="000000"/>
+                </a:solidFill>
+                <a:effectLst/>
+                <a:uLnTx/>
+                <a:uFillTx/>
+                <a:latin typeface="Helvetica" pitchFamily="2" charset="0"/>
+                <a:ea typeface="+mn-ea"/>
+                <a:cs typeface="+mn-cs"/>
+              </a:rPr>
+              <a:t> </a:t>
+            </a:r>
+            <a:endParaRPr lang="en-GB" dirty="0">
+              <a:solidFill>
+                <a:srgbClr val="000000"/>
+              </a:solidFill>
+              <a:latin typeface="Helvetica" pitchFamily="2" charset="0"/>
+            </a:endParaRPr>
+          </a:p>
+          <a:p>
             <a:r>
               <a:rPr lang="en-GB" b="1" i="0" u="none" strike="noStrike" dirty="0">
                 <a:solidFill>
@@ -9760,7 +9970,7 @@
                 <a:effectLst/>
                 <a:latin typeface="Helvetica" pitchFamily="2" charset="0"/>
               </a:rPr>
-              <a:t>Time Series Analytics</a:t>
+              <a:t>Continual AI </a:t>
             </a:r>
             <a:r>
               <a:rPr lang="en-GB" b="0" i="0" u="none" strike="noStrike" dirty="0">
@@ -9770,119 +9980,32 @@
                 <a:effectLst/>
                 <a:latin typeface="Helvetica" pitchFamily="2" charset="0"/>
               </a:rPr>
-              <a:t> and </a:t>
-            </a:r>
-            <a:r>
-              <a:rPr lang="en-GB" b="1" i="0" u="none" strike="noStrike" dirty="0">
+              <a:t>using </a:t>
+            </a:r>
+            <a:r>
+              <a:rPr lang="en-GB" b="0" i="0" u="none" strike="noStrike" dirty="0">
                 <a:solidFill>
                   <a:srgbClr val="000000"/>
                 </a:solidFill>
                 <a:effectLst/>
                 <a:latin typeface="Helvetica" pitchFamily="2" charset="0"/>
-              </a:rPr>
-              <a:t>Continual AI </a:t>
-            </a:r>
-            <a:r>
-              <a:rPr lang="en-GB" i="0" u="none" strike="noStrike" dirty="0">
-                <a:solidFill>
-                  <a:srgbClr val="000000"/>
-                </a:solidFill>
-                <a:effectLst/>
-                <a:latin typeface="Helvetica" pitchFamily="2" charset="0"/>
-              </a:rPr>
-              <a:t>to </a:t>
-            </a:r>
-            <a:r>
-              <a:rPr lang="en-GB" b="0" i="0" u="none" strike="noStrike" dirty="0">
-                <a:solidFill>
-                  <a:srgbClr val="000000"/>
-                </a:solidFill>
-                <a:effectLst/>
-                <a:latin typeface="Helvetica" pitchFamily="2" charset="0"/>
-              </a:rPr>
-              <a:t>real-world libraries such as </a:t>
-            </a:r>
-            <a:r>
-              <a:rPr lang="en-GB" b="0" i="0" u="none" strike="noStrike" dirty="0">
-                <a:solidFill>
-                  <a:srgbClr val="4183C4"/>
-                </a:solidFill>
-                <a:effectLst/>
-                <a:latin typeface="Helvetica" pitchFamily="2" charset="0"/>
-                <a:hlinkClick r:id="rId2"/>
-              </a:rPr>
-              <a:t>MOA</a:t>
-            </a:r>
-            <a:r>
-              <a:rPr lang="en-GB" dirty="0">
-                <a:solidFill>
-                  <a:srgbClr val="000000"/>
-                </a:solidFill>
-                <a:latin typeface="Helvetica" pitchFamily="2" charset="0"/>
-              </a:rPr>
-              <a:t>,</a:t>
-            </a:r>
-            <a:r>
-              <a:rPr lang="en-GB" b="0" i="0" u="none" strike="noStrike" dirty="0">
-                <a:solidFill>
-                  <a:srgbClr val="000000"/>
-                </a:solidFill>
-                <a:effectLst/>
-                <a:latin typeface="Helvetica" pitchFamily="2" charset="0"/>
-              </a:rPr>
-              <a:t> </a:t>
-            </a:r>
-            <a:r>
-              <a:rPr lang="en-GB" b="0" i="0" u="none" strike="noStrike" dirty="0">
-                <a:solidFill>
-                  <a:srgbClr val="4183C4"/>
-                </a:solidFill>
-                <a:effectLst/>
-                <a:latin typeface="Helvetica" pitchFamily="2" charset="0"/>
-                <a:hlinkClick r:id="rId3"/>
-              </a:rPr>
-              <a:t>River</a:t>
-            </a:r>
-            <a:r>
-              <a:rPr lang="en-GB" dirty="0">
-                <a:solidFill>
-                  <a:srgbClr val="000000"/>
-                </a:solidFill>
-                <a:latin typeface="Helvetica" pitchFamily="2" charset="0"/>
-              </a:rPr>
-              <a:t>, </a:t>
-            </a:r>
-            <a:r>
-              <a:rPr lang="en-GB" b="0" i="0" u="none" strike="noStrike" dirty="0">
-                <a:solidFill>
-                  <a:srgbClr val="FF0000"/>
-                </a:solidFill>
-                <a:effectLst/>
-                <a:latin typeface="Helvetica" pitchFamily="2" charset="0"/>
-              </a:rPr>
-              <a:t>TBC</a:t>
-            </a:r>
-            <a:r>
-              <a:rPr lang="en-GB" b="0" i="0" u="none" strike="noStrike" dirty="0">
-                <a:solidFill>
-                  <a:srgbClr val="000000"/>
-                </a:solidFill>
-                <a:effectLst/>
-                <a:latin typeface="Helvetica" pitchFamily="2" charset="0"/>
-              </a:rPr>
-              <a:t>, and </a:t>
-            </a:r>
-            <a:r>
-              <a:rPr lang="en-GB" b="0" i="0" u="none" strike="noStrike" dirty="0">
-                <a:solidFill>
-                  <a:srgbClr val="000000"/>
-                </a:solidFill>
-                <a:effectLst/>
-                <a:latin typeface="Helvetica" pitchFamily="2" charset="0"/>
-                <a:hlinkClick r:id="rId4"/>
+                <a:hlinkClick r:id="rId6"/>
               </a:rPr>
               <a:t>Avalanche</a:t>
             </a:r>
+            <a:endParaRPr lang="en-GB" b="0" i="0" u="none" strike="noStrike" dirty="0">
+              <a:solidFill>
+                <a:srgbClr val="000000"/>
+              </a:solidFill>
+              <a:effectLst/>
+              <a:latin typeface="Helvetica" pitchFamily="2" charset="0"/>
+            </a:endParaRPr>
+          </a:p>
+          <a:p>
+            <a:pPr algn="l">
+              <a:buFont typeface="Arial" panose="020B0604020202020204" pitchFamily="34" charset="0"/>
+              <a:buChar char="•"/>
+            </a:pPr>
             <a:endParaRPr lang="en-US" dirty="0"/>
           </a:p>
         </p:txBody>

</xml_diff>